<commit_message>
Latest version of ppt
Cuisines grouped
</commit_message>
<xml_diff>
--- a/Final notebooks/Zomato_Presentation_EW_20200712.pptx
+++ b/Final notebooks/Zomato_Presentation_EW_20200712.pptx
@@ -210,7 +210,7 @@
           <a:p>
             <a:fld id="{EB89C686-A75F-4E47-97E1-C7954E3DAA2A}" type="datetimeFigureOut">
               <a:rPr lang="en-AU" smtClean="0"/>
-              <a:t>13/07/2020</a:t>
+              <a:t>14/07/2020</a:t>
             </a:fld>
             <a:endParaRPr lang="en-AU"/>
           </a:p>
@@ -573,7 +573,7 @@
           <a:effectLst/>
           <a:extLst>
             <a:ext uri="{91240B29-F687-4f45-9708-019B960494DF}">
-              <a14:hiddenLine xmlns="" xmlns:a14="http://schemas.microsoft.com/office/drawing/2010/main" w="9525">
+              <a14:hiddenLine xmlns:a14="http://schemas.microsoft.com/office/drawing/2010/main" xmlns="" w="9525">
                 <a:solidFill>
                   <a:srgbClr val="000000"/>
                 </a:solidFill>
@@ -903,7 +903,7 @@
           <a:ln/>
           <a:extLst>
             <a:ext uri="{91240B29-F687-4f45-9708-019B960494DF}">
-              <a14:hiddenLine xmlns="" xmlns:a14="http://schemas.microsoft.com/office/drawing/2010/main" w="9525">
+              <a14:hiddenLine xmlns:a14="http://schemas.microsoft.com/office/drawing/2010/main" xmlns="" w="9525">
                 <a:solidFill>
                   <a:srgbClr val="000000"/>
                 </a:solidFill>
@@ -1205,7 +1205,7 @@
           <a:ln/>
           <a:extLst>
             <a:ext uri="{91240B29-F687-4f45-9708-019B960494DF}">
-              <a14:hiddenLine xmlns="" xmlns:a14="http://schemas.microsoft.com/office/drawing/2010/main" w="9525">
+              <a14:hiddenLine xmlns:a14="http://schemas.microsoft.com/office/drawing/2010/main" xmlns="" w="9525">
                 <a:solidFill>
                   <a:srgbClr val="000000"/>
                 </a:solidFill>
@@ -1568,7 +1568,7 @@
           <a:ln/>
           <a:extLst>
             <a:ext uri="{91240B29-F687-4f45-9708-019B960494DF}">
-              <a14:hiddenLine xmlns="" xmlns:a14="http://schemas.microsoft.com/office/drawing/2010/main" w="9525">
+              <a14:hiddenLine xmlns:a14="http://schemas.microsoft.com/office/drawing/2010/main" xmlns="" w="9525">
                 <a:solidFill>
                   <a:srgbClr val="000000"/>
                 </a:solidFill>
@@ -2178,7 +2178,7 @@
           <a:ln/>
           <a:extLst>
             <a:ext uri="{91240B29-F687-4f45-9708-019B960494DF}">
-              <a14:hiddenLine xmlns="" xmlns:a14="http://schemas.microsoft.com/office/drawing/2010/main" w="9525">
+              <a14:hiddenLine xmlns:a14="http://schemas.microsoft.com/office/drawing/2010/main" xmlns="" w="9525">
                 <a:solidFill>
                   <a:srgbClr val="000000"/>
                 </a:solidFill>
@@ -3650,10 +3650,10 @@
       </p:sp>
       <p:pic>
         <p:nvPicPr>
-          <p:cNvPr id="8" name="Content Placeholder 7" descr="A screenshot of a cell phone&#10;&#10;Description automatically generated">
+          <p:cNvPr id="7" name="Content Placeholder 6" descr="A screenshot of a cell phone&#10;&#10;Description automatically generated">
             <a:extLst>
               <a:ext uri="{FF2B5EF4-FFF2-40B4-BE49-F238E27FC236}">
-                <a16:creationId xmlns:a16="http://schemas.microsoft.com/office/drawing/2014/main" id="{D8832423-2E1E-4875-A40D-A1687271B9A0}"/>
+                <a16:creationId xmlns:a16="http://schemas.microsoft.com/office/drawing/2014/main" id="{64CFF04D-2147-4636-BDB8-377628B80FDA}"/>
               </a:ext>
             </a:extLst>
           </p:cNvPr>
@@ -3664,16 +3664,15 @@
             <p:ph idx="1"/>
           </p:nvPr>
         </p:nvPicPr>
-        <p:blipFill>
+        <p:blipFill rotWithShape="1">
           <a:blip r:embed="rId2"/>
-          <a:stretch>
-            <a:fillRect/>
-          </a:stretch>
+          <a:srcRect t="6694" r="7864" b="5448"/>
+          <a:stretch/>
         </p:blipFill>
         <p:spPr>
           <a:xfrm>
-            <a:off x="5133980" y="2143122"/>
-            <a:ext cx="6684209" cy="4456140"/>
+            <a:off x="4907698" y="2067339"/>
+            <a:ext cx="7150011" cy="4545361"/>
           </a:xfrm>
         </p:spPr>
       </p:pic>

</xml_diff>